<commit_message>
Update Choosing right Data Service.pptx
</commit_message>
<xml_diff>
--- a/sessions/GAB 2021/Choosing right Data Service.pptx
+++ b/sessions/GAB 2021/Choosing right Data Service.pptx
@@ -5,27 +5,29 @@
     <p:sldMasterId id="2147483660" r:id="rId1"/>
   </p:sldMasterIdLst>
   <p:notesMasterIdLst>
-    <p:notesMasterId r:id="rId20"/>
+    <p:notesMasterId r:id="rId22"/>
   </p:notesMasterIdLst>
   <p:sldIdLst>
     <p:sldId id="256" r:id="rId2"/>
     <p:sldId id="257" r:id="rId3"/>
     <p:sldId id="260" r:id="rId4"/>
     <p:sldId id="266" r:id="rId5"/>
-    <p:sldId id="267" r:id="rId6"/>
-    <p:sldId id="258" r:id="rId7"/>
-    <p:sldId id="263" r:id="rId8"/>
-    <p:sldId id="264" r:id="rId9"/>
-    <p:sldId id="265" r:id="rId10"/>
-    <p:sldId id="262" r:id="rId11"/>
-    <p:sldId id="271" r:id="rId12"/>
-    <p:sldId id="274" r:id="rId13"/>
-    <p:sldId id="275" r:id="rId14"/>
-    <p:sldId id="272" r:id="rId15"/>
-    <p:sldId id="273" r:id="rId16"/>
-    <p:sldId id="270" r:id="rId17"/>
-    <p:sldId id="269" r:id="rId18"/>
-    <p:sldId id="268" r:id="rId19"/>
+    <p:sldId id="276" r:id="rId6"/>
+    <p:sldId id="267" r:id="rId7"/>
+    <p:sldId id="258" r:id="rId8"/>
+    <p:sldId id="263" r:id="rId9"/>
+    <p:sldId id="264" r:id="rId10"/>
+    <p:sldId id="265" r:id="rId11"/>
+    <p:sldId id="262" r:id="rId12"/>
+    <p:sldId id="277" r:id="rId13"/>
+    <p:sldId id="271" r:id="rId14"/>
+    <p:sldId id="274" r:id="rId15"/>
+    <p:sldId id="275" r:id="rId16"/>
+    <p:sldId id="272" r:id="rId17"/>
+    <p:sldId id="273" r:id="rId18"/>
+    <p:sldId id="270" r:id="rId19"/>
+    <p:sldId id="269" r:id="rId20"/>
+    <p:sldId id="268" r:id="rId21"/>
   </p:sldIdLst>
   <p:sldSz cx="12192000" cy="6858000"/>
   <p:notesSz cx="6858000" cy="9144000"/>
@@ -540,7 +542,7 @@
           <a:p>
             <a:r>
               <a:rPr lang="en-GB" dirty="0"/>
-              <a:t>Technology democratization has led to make available best features, killer open-source frameworks to be available in almost all products in a line. Although the cloud provider used in one’s company takes priority, it makes it difficult to choose the best that fits for requirement. In this session, let me share my learnings, how our team analysed different frameworks for use cases. I hope it would help someone to choose the right data analytics tool for his need.</a:t>
+              <a:t>Technology democratization has led to make available the best features and the killer open-source frameworks to be available in almost all products in a line. Although the cloud provider used in one’s company takes priority, it makes it difficult to choose the best that fits for requirement. In this session, let me share my learnings, how our team analysed different frameworks for use cases. I hope it would help someone to choose the right data analytics tool for his need.</a:t>
             </a:r>
             <a:endParaRPr lang="en-IN" dirty="0"/>
           </a:p>
@@ -876,7 +878,7 @@
           <a:p>
             <a:fld id="{61D11EEE-6408-426C-86EC-A45CD40E17C7}" type="slidenum">
               <a:rPr lang="en-IN" smtClean="0"/>
-              <a:t>5</a:t>
+              <a:t>6</a:t>
             </a:fld>
             <a:endParaRPr lang="en-IN"/>
           </a:p>
@@ -960,7 +962,7 @@
           <a:p>
             <a:fld id="{61D11EEE-6408-426C-86EC-A45CD40E17C7}" type="slidenum">
               <a:rPr lang="en-IN" smtClean="0"/>
-              <a:t>6</a:t>
+              <a:t>7</a:t>
             </a:fld>
             <a:endParaRPr lang="en-IN"/>
           </a:p>
@@ -1044,7 +1046,7 @@
           <a:p>
             <a:fld id="{61D11EEE-6408-426C-86EC-A45CD40E17C7}" type="slidenum">
               <a:rPr lang="en-IN" smtClean="0"/>
-              <a:t>12</a:t>
+              <a:t>14</a:t>
             </a:fld>
             <a:endParaRPr lang="en-IN"/>
           </a:p>
@@ -1132,7 +1134,7 @@
           <a:p>
             <a:fld id="{61D11EEE-6408-426C-86EC-A45CD40E17C7}" type="slidenum">
               <a:rPr lang="en-IN" smtClean="0"/>
-              <a:t>15</a:t>
+              <a:t>17</a:t>
             </a:fld>
             <a:endParaRPr lang="en-IN"/>
           </a:p>
@@ -1220,7 +1222,7 @@
           <a:p>
             <a:fld id="{61D11EEE-6408-426C-86EC-A45CD40E17C7}" type="slidenum">
               <a:rPr lang="en-IN" smtClean="0"/>
-              <a:t>16</a:t>
+              <a:t>18</a:t>
             </a:fld>
             <a:endParaRPr lang="en-IN"/>
           </a:p>
@@ -21844,6 +21846,94 @@
           <p:cNvPr id="2" name="Title 1">
             <a:extLst>
               <a:ext uri="{FF2B5EF4-FFF2-40B4-BE49-F238E27FC236}">
+                <a16:creationId xmlns:a16="http://schemas.microsoft.com/office/drawing/2014/main" id="{5B87CF65-8203-45A0-8A1D-449B3DDD5664}"/>
+              </a:ext>
+            </a:extLst>
+          </p:cNvPr>
+          <p:cNvSpPr>
+            <a:spLocks noGrp="1"/>
+          </p:cNvSpPr>
+          <p:nvPr>
+            <p:ph type="title"/>
+          </p:nvPr>
+        </p:nvSpPr>
+        <p:spPr/>
+        <p:txBody>
+          <a:bodyPr/>
+          <a:lstStyle/>
+          <a:p>
+            <a:r>
+              <a:rPr lang="en-GB" dirty="0"/>
+              <a:t>Data LAKEHOUSE</a:t>
+            </a:r>
+            <a:endParaRPr lang="en-IN" dirty="0"/>
+          </a:p>
+        </p:txBody>
+      </p:sp>
+      <p:sp>
+        <p:nvSpPr>
+          <p:cNvPr id="3" name="Content Placeholder 2">
+            <a:extLst>
+              <a:ext uri="{FF2B5EF4-FFF2-40B4-BE49-F238E27FC236}">
+                <a16:creationId xmlns:a16="http://schemas.microsoft.com/office/drawing/2014/main" id="{86CBC334-2225-4ED6-8E26-6DDD7BD9E2FA}"/>
+              </a:ext>
+            </a:extLst>
+          </p:cNvPr>
+          <p:cNvSpPr>
+            <a:spLocks noGrp="1"/>
+          </p:cNvSpPr>
+          <p:nvPr>
+            <p:ph idx="1"/>
+          </p:nvPr>
+        </p:nvSpPr>
+        <p:spPr/>
+        <p:txBody>
+          <a:bodyPr/>
+          <a:lstStyle/>
+          <a:p>
+            <a:r>
+              <a:rPr lang="en-GB" dirty="0"/>
+              <a:t>* Sting together the best of both worlds – Data warehouse and Data lake.</a:t>
+            </a:r>
+            <a:endParaRPr lang="en-IN" dirty="0"/>
+          </a:p>
+        </p:txBody>
+      </p:sp>
+    </p:spTree>
+    <p:extLst>
+      <p:ext uri="{BB962C8B-B14F-4D97-AF65-F5344CB8AC3E}">
+        <p14:creationId xmlns:p14="http://schemas.microsoft.com/office/powerpoint/2010/main" val="3135131184"/>
+      </p:ext>
+    </p:extLst>
+  </p:cSld>
+  <p:clrMapOvr>
+    <a:masterClrMapping/>
+  </p:clrMapOvr>
+</p:sld>
+</file>
+
+<file path=ppt/slides/slide11.xml><?xml version="1.0" encoding="utf-8"?>
+<p:sld xmlns:a="http://schemas.openxmlformats.org/drawingml/2006/main" xmlns:r="http://schemas.openxmlformats.org/officeDocument/2006/relationships" xmlns:p="http://schemas.openxmlformats.org/presentationml/2006/main">
+  <p:cSld>
+    <p:spTree>
+      <p:nvGrpSpPr>
+        <p:cNvPr id="1" name=""/>
+        <p:cNvGrpSpPr/>
+        <p:nvPr/>
+      </p:nvGrpSpPr>
+      <p:grpSpPr>
+        <a:xfrm>
+          <a:off x="0" y="0"/>
+          <a:ext cx="0" cy="0"/>
+          <a:chOff x="0" y="0"/>
+          <a:chExt cx="0" cy="0"/>
+        </a:xfrm>
+      </p:grpSpPr>
+      <p:sp>
+        <p:nvSpPr>
+          <p:cNvPr id="2" name="Title 1">
+            <a:extLst>
+              <a:ext uri="{FF2B5EF4-FFF2-40B4-BE49-F238E27FC236}">
                 <a16:creationId xmlns:a16="http://schemas.microsoft.com/office/drawing/2014/main" id="{B166AB00-3643-4180-B7ED-73AE2A87ADB3}"/>
               </a:ext>
             </a:extLst>
@@ -21916,7 +22006,84 @@
 </p:sld>
 </file>
 
-<file path=ppt/slides/slide11.xml><?xml version="1.0" encoding="utf-8"?>
+<file path=ppt/slides/slide12.xml><?xml version="1.0" encoding="utf-8"?>
+<p:sld xmlns:a="http://schemas.openxmlformats.org/drawingml/2006/main" xmlns:r="http://schemas.openxmlformats.org/officeDocument/2006/relationships" xmlns:p="http://schemas.openxmlformats.org/presentationml/2006/main">
+  <p:cSld>
+    <p:spTree>
+      <p:nvGrpSpPr>
+        <p:cNvPr id="1" name=""/>
+        <p:cNvGrpSpPr/>
+        <p:nvPr/>
+      </p:nvGrpSpPr>
+      <p:grpSpPr>
+        <a:xfrm>
+          <a:off x="0" y="0"/>
+          <a:ext cx="0" cy="0"/>
+          <a:chOff x="0" y="0"/>
+          <a:chExt cx="0" cy="0"/>
+        </a:xfrm>
+      </p:grpSpPr>
+      <p:pic>
+        <p:nvPicPr>
+          <p:cNvPr id="3074" name="Picture 2">
+            <a:extLst>
+              <a:ext uri="{FF2B5EF4-FFF2-40B4-BE49-F238E27FC236}">
+                <a16:creationId xmlns:a16="http://schemas.microsoft.com/office/drawing/2014/main" id="{55530FED-4EFE-41A4-AE39-512AE0D0F96A}"/>
+              </a:ext>
+            </a:extLst>
+          </p:cNvPr>
+          <p:cNvPicPr>
+            <a:picLocks noChangeAspect="1" noChangeArrowheads="1"/>
+          </p:cNvPicPr>
+          <p:nvPr/>
+        </p:nvPicPr>
+        <p:blipFill>
+          <a:blip r:embed="rId2">
+            <a:extLst>
+              <a:ext uri="{28A0092B-C50C-407E-A947-70E740481C1C}">
+                <a14:useLocalDpi xmlns:a14="http://schemas.microsoft.com/office/drawing/2010/main" val="0"/>
+              </a:ext>
+            </a:extLst>
+          </a:blip>
+          <a:srcRect/>
+          <a:stretch>
+            <a:fillRect/>
+          </a:stretch>
+        </p:blipFill>
+        <p:spPr bwMode="auto">
+          <a:xfrm>
+            <a:off x="381000" y="428625"/>
+            <a:ext cx="11430000" cy="6000750"/>
+          </a:xfrm>
+          <a:prstGeom prst="rect">
+            <a:avLst/>
+          </a:prstGeom>
+          <a:noFill/>
+          <a:extLst>
+            <a:ext uri="{909E8E84-426E-40DD-AFC4-6F175D3DCCD1}">
+              <a14:hiddenFill xmlns:a14="http://schemas.microsoft.com/office/drawing/2010/main">
+                <a:solidFill>
+                  <a:srgbClr val="FFFFFF"/>
+                </a:solidFill>
+              </a14:hiddenFill>
+            </a:ext>
+          </a:extLst>
+        </p:spPr>
+      </p:pic>
+    </p:spTree>
+    <p:extLst>
+      <p:ext uri="{BB962C8B-B14F-4D97-AF65-F5344CB8AC3E}">
+        <p14:creationId xmlns:p14="http://schemas.microsoft.com/office/powerpoint/2010/main" val="1528854340"/>
+      </p:ext>
+    </p:extLst>
+  </p:cSld>
+  <p:clrMapOvr>
+    <a:masterClrMapping/>
+  </p:clrMapOvr>
+</p:sld>
+</file>
+
+<file path=ppt/slides/slide13.xml><?xml version="1.0" encoding="utf-8"?>
 <p:sld xmlns:a="http://schemas.openxmlformats.org/drawingml/2006/main" xmlns:r="http://schemas.openxmlformats.org/officeDocument/2006/relationships" xmlns:p="http://schemas.openxmlformats.org/presentationml/2006/main">
   <p:cSld>
     <p:spTree>
@@ -22025,7 +22192,7 @@
 </p:sld>
 </file>
 
-<file path=ppt/slides/slide12.xml><?xml version="1.0" encoding="utf-8"?>
+<file path=ppt/slides/slide14.xml><?xml version="1.0" encoding="utf-8"?>
 <p:sld xmlns:a="http://schemas.openxmlformats.org/drawingml/2006/main" xmlns:r="http://schemas.openxmlformats.org/officeDocument/2006/relationships" xmlns:p="http://schemas.openxmlformats.org/presentationml/2006/main">
   <p:cSld>
     <p:spTree>
@@ -22109,7 +22276,7 @@
 </p:sld>
 </file>
 
-<file path=ppt/slides/slide13.xml><?xml version="1.0" encoding="utf-8"?>
+<file path=ppt/slides/slide15.xml><?xml version="1.0" encoding="utf-8"?>
 <p:sld xmlns:a="http://schemas.openxmlformats.org/drawingml/2006/main" xmlns:r="http://schemas.openxmlformats.org/officeDocument/2006/relationships" xmlns:p="http://schemas.openxmlformats.org/presentationml/2006/main">
   <p:cSld>
     <p:spTree>
@@ -22197,7 +22364,7 @@
 </p:sld>
 </file>
 
-<file path=ppt/slides/slide14.xml><?xml version="1.0" encoding="utf-8"?>
+<file path=ppt/slides/slide16.xml><?xml version="1.0" encoding="utf-8"?>
 <p:sld xmlns:a="http://schemas.openxmlformats.org/drawingml/2006/main" xmlns:r="http://schemas.openxmlformats.org/officeDocument/2006/relationships" xmlns:p="http://schemas.openxmlformats.org/presentationml/2006/main">
   <p:cSld>
     <p:spTree>
@@ -22658,7 +22825,7 @@
 </p:sld>
 </file>
 
-<file path=ppt/slides/slide15.xml><?xml version="1.0" encoding="utf-8"?>
+<file path=ppt/slides/slide17.xml><?xml version="1.0" encoding="utf-8"?>
 <p:sld xmlns:a="http://schemas.openxmlformats.org/drawingml/2006/main" xmlns:r="http://schemas.openxmlformats.org/officeDocument/2006/relationships" xmlns:p="http://schemas.openxmlformats.org/presentationml/2006/main">
   <p:cSld>
     <p:spTree>
@@ -23137,7 +23304,7 @@
 </p:sld>
 </file>
 
-<file path=ppt/slides/slide16.xml><?xml version="1.0" encoding="utf-8"?>
+<file path=ppt/slides/slide18.xml><?xml version="1.0" encoding="utf-8"?>
 <p:sld xmlns:a="http://schemas.openxmlformats.org/drawingml/2006/main" xmlns:r="http://schemas.openxmlformats.org/officeDocument/2006/relationships" xmlns:p="http://schemas.openxmlformats.org/presentationml/2006/main">
   <p:cSld>
     <p:spTree>
@@ -23267,7 +23434,7 @@
 </p:sld>
 </file>
 
-<file path=ppt/slides/slide17.xml><?xml version="1.0" encoding="utf-8"?>
+<file path=ppt/slides/slide19.xml><?xml version="1.0" encoding="utf-8"?>
 <p:sld xmlns:a="http://schemas.openxmlformats.org/drawingml/2006/main" xmlns:r="http://schemas.openxmlformats.org/officeDocument/2006/relationships" xmlns:p="http://schemas.openxmlformats.org/presentationml/2006/main">
   <p:cSld>
     <p:spTree>
@@ -23389,165 +23556,6 @@
     <p:extLst>
       <p:ext uri="{BB962C8B-B14F-4D97-AF65-F5344CB8AC3E}">
         <p14:creationId xmlns:p14="http://schemas.microsoft.com/office/powerpoint/2010/main" val="2629790823"/>
-      </p:ext>
-    </p:extLst>
-  </p:cSld>
-  <p:clrMapOvr>
-    <a:masterClrMapping/>
-  </p:clrMapOvr>
-</p:sld>
-</file>
-
-<file path=ppt/slides/slide18.xml><?xml version="1.0" encoding="utf-8"?>
-<p:sld xmlns:a="http://schemas.openxmlformats.org/drawingml/2006/main" xmlns:r="http://schemas.openxmlformats.org/officeDocument/2006/relationships" xmlns:p="http://schemas.openxmlformats.org/presentationml/2006/main">
-  <p:cSld>
-    <p:spTree>
-      <p:nvGrpSpPr>
-        <p:cNvPr id="1" name=""/>
-        <p:cNvGrpSpPr/>
-        <p:nvPr/>
-      </p:nvGrpSpPr>
-      <p:grpSpPr>
-        <a:xfrm>
-          <a:off x="0" y="0"/>
-          <a:ext cx="0" cy="0"/>
-          <a:chOff x="0" y="0"/>
-          <a:chExt cx="0" cy="0"/>
-        </a:xfrm>
-      </p:grpSpPr>
-      <p:sp>
-        <p:nvSpPr>
-          <p:cNvPr id="2" name="Title 1">
-            <a:extLst>
-              <a:ext uri="{FF2B5EF4-FFF2-40B4-BE49-F238E27FC236}">
-                <a16:creationId xmlns:a16="http://schemas.microsoft.com/office/drawing/2014/main" id="{5821B448-FBBB-44C8-9056-3CB932167082}"/>
-              </a:ext>
-            </a:extLst>
-          </p:cNvPr>
-          <p:cNvSpPr>
-            <a:spLocks noGrp="1"/>
-          </p:cNvSpPr>
-          <p:nvPr>
-            <p:ph type="title"/>
-          </p:nvPr>
-        </p:nvSpPr>
-        <p:spPr/>
-        <p:txBody>
-          <a:bodyPr/>
-          <a:lstStyle/>
-          <a:p>
-            <a:r>
-              <a:rPr lang="en-GB" dirty="0"/>
-              <a:t>Resources</a:t>
-            </a:r>
-            <a:endParaRPr lang="en-IN" dirty="0"/>
-          </a:p>
-        </p:txBody>
-      </p:sp>
-      <p:sp>
-        <p:nvSpPr>
-          <p:cNvPr id="3" name="Content Placeholder 2">
-            <a:extLst>
-              <a:ext uri="{FF2B5EF4-FFF2-40B4-BE49-F238E27FC236}">
-                <a16:creationId xmlns:a16="http://schemas.microsoft.com/office/drawing/2014/main" id="{DC69A0EA-B13B-4A87-A240-D95AF06EDA6C}"/>
-              </a:ext>
-            </a:extLst>
-          </p:cNvPr>
-          <p:cNvSpPr>
-            <a:spLocks noGrp="1"/>
-          </p:cNvSpPr>
-          <p:nvPr>
-            <p:ph idx="1"/>
-          </p:nvPr>
-        </p:nvSpPr>
-        <p:spPr/>
-        <p:txBody>
-          <a:bodyPr/>
-          <a:lstStyle/>
-          <a:p>
-            <a:r>
-              <a:rPr lang="en-GB" dirty="0"/>
-              <a:t>* Blog post by Ivana </a:t>
-            </a:r>
-            <a:r>
-              <a:rPr lang="en-GB" dirty="0" err="1"/>
-              <a:t>Pejeva</a:t>
-            </a:r>
-            <a:r>
-              <a:rPr lang="en-GB" dirty="0"/>
-              <a:t> - </a:t>
-            </a:r>
-            <a:r>
-              <a:rPr lang="en-GB" dirty="0">
-                <a:hlinkClick r:id="rId2"/>
-              </a:rPr>
-              <a:t>https://www.element61.be/en/resource/when-use-azure-synapse-analytics-andor-azure-databricks</a:t>
-            </a:r>
-            <a:r>
-              <a:rPr lang="en-GB" dirty="0"/>
-              <a:t> </a:t>
-            </a:r>
-          </a:p>
-          <a:p>
-            <a:r>
-              <a:rPr lang="en-GB" dirty="0"/>
-              <a:t>* Checkout </a:t>
-            </a:r>
-            <a:r>
-              <a:rPr lang="en-GB" dirty="0">
-                <a:hlinkClick r:id="rId3"/>
-              </a:rPr>
-              <a:t>debate</a:t>
-            </a:r>
-            <a:r>
-              <a:rPr lang="en-GB" dirty="0"/>
-              <a:t> with proponents of each architecture at </a:t>
-            </a:r>
-            <a:r>
-              <a:rPr lang="en-GB" dirty="0" err="1"/>
-              <a:t>Datanova</a:t>
-            </a:r>
-            <a:r>
-              <a:rPr lang="en-GB" dirty="0"/>
-              <a:t> 2021 hosted by </a:t>
-            </a:r>
-            <a:r>
-              <a:rPr lang="en-IN" b="1" i="0" u="none" strike="noStrike" dirty="0">
-                <a:solidFill>
-                  <a:srgbClr val="00A7B5"/>
-                </a:solidFill>
-                <a:effectLst/>
-                <a:latin typeface="Montserrat"/>
-                <a:hlinkClick r:id="rId4"/>
-              </a:rPr>
-              <a:t>Cindi Howson</a:t>
-            </a:r>
-            <a:endParaRPr lang="en-IN" b="1" i="0" u="none" strike="noStrike" dirty="0">
-              <a:solidFill>
-                <a:srgbClr val="00A7B5"/>
-              </a:solidFill>
-              <a:effectLst/>
-              <a:latin typeface="Montserrat"/>
-            </a:endParaRPr>
-          </a:p>
-          <a:p>
-            <a:endParaRPr lang="en-IN" b="1" i="0" u="none" strike="noStrike" dirty="0">
-              <a:solidFill>
-                <a:srgbClr val="00A7B5"/>
-              </a:solidFill>
-              <a:effectLst/>
-              <a:latin typeface="Montserrat"/>
-            </a:endParaRPr>
-          </a:p>
-          <a:p>
-            <a:endParaRPr lang="en-IN" dirty="0"/>
-          </a:p>
-        </p:txBody>
-      </p:sp>
-    </p:spTree>
-    <p:extLst>
-      <p:ext uri="{BB962C8B-B14F-4D97-AF65-F5344CB8AC3E}">
-        <p14:creationId xmlns:p14="http://schemas.microsoft.com/office/powerpoint/2010/main" val="1854144517"/>
       </p:ext>
     </p:extLst>
   </p:cSld>
@@ -24073,6 +24081,165 @@
 </p:sld>
 </file>
 
+<file path=ppt/slides/slide20.xml><?xml version="1.0" encoding="utf-8"?>
+<p:sld xmlns:a="http://schemas.openxmlformats.org/drawingml/2006/main" xmlns:r="http://schemas.openxmlformats.org/officeDocument/2006/relationships" xmlns:p="http://schemas.openxmlformats.org/presentationml/2006/main">
+  <p:cSld>
+    <p:spTree>
+      <p:nvGrpSpPr>
+        <p:cNvPr id="1" name=""/>
+        <p:cNvGrpSpPr/>
+        <p:nvPr/>
+      </p:nvGrpSpPr>
+      <p:grpSpPr>
+        <a:xfrm>
+          <a:off x="0" y="0"/>
+          <a:ext cx="0" cy="0"/>
+          <a:chOff x="0" y="0"/>
+          <a:chExt cx="0" cy="0"/>
+        </a:xfrm>
+      </p:grpSpPr>
+      <p:sp>
+        <p:nvSpPr>
+          <p:cNvPr id="2" name="Title 1">
+            <a:extLst>
+              <a:ext uri="{FF2B5EF4-FFF2-40B4-BE49-F238E27FC236}">
+                <a16:creationId xmlns:a16="http://schemas.microsoft.com/office/drawing/2014/main" id="{5821B448-FBBB-44C8-9056-3CB932167082}"/>
+              </a:ext>
+            </a:extLst>
+          </p:cNvPr>
+          <p:cNvSpPr>
+            <a:spLocks noGrp="1"/>
+          </p:cNvSpPr>
+          <p:nvPr>
+            <p:ph type="title"/>
+          </p:nvPr>
+        </p:nvSpPr>
+        <p:spPr/>
+        <p:txBody>
+          <a:bodyPr/>
+          <a:lstStyle/>
+          <a:p>
+            <a:r>
+              <a:rPr lang="en-GB" dirty="0"/>
+              <a:t>Resources</a:t>
+            </a:r>
+            <a:endParaRPr lang="en-IN" dirty="0"/>
+          </a:p>
+        </p:txBody>
+      </p:sp>
+      <p:sp>
+        <p:nvSpPr>
+          <p:cNvPr id="3" name="Content Placeholder 2">
+            <a:extLst>
+              <a:ext uri="{FF2B5EF4-FFF2-40B4-BE49-F238E27FC236}">
+                <a16:creationId xmlns:a16="http://schemas.microsoft.com/office/drawing/2014/main" id="{DC69A0EA-B13B-4A87-A240-D95AF06EDA6C}"/>
+              </a:ext>
+            </a:extLst>
+          </p:cNvPr>
+          <p:cNvSpPr>
+            <a:spLocks noGrp="1"/>
+          </p:cNvSpPr>
+          <p:nvPr>
+            <p:ph idx="1"/>
+          </p:nvPr>
+        </p:nvSpPr>
+        <p:spPr/>
+        <p:txBody>
+          <a:bodyPr/>
+          <a:lstStyle/>
+          <a:p>
+            <a:r>
+              <a:rPr lang="en-GB" dirty="0"/>
+              <a:t>* Blog post by Ivana </a:t>
+            </a:r>
+            <a:r>
+              <a:rPr lang="en-GB" dirty="0" err="1"/>
+              <a:t>Pejeva</a:t>
+            </a:r>
+            <a:r>
+              <a:rPr lang="en-GB" dirty="0"/>
+              <a:t> - </a:t>
+            </a:r>
+            <a:r>
+              <a:rPr lang="en-GB" dirty="0">
+                <a:hlinkClick r:id="rId2"/>
+              </a:rPr>
+              <a:t>https://www.element61.be/en/resource/when-use-azure-synapse-analytics-andor-azure-databricks</a:t>
+            </a:r>
+            <a:r>
+              <a:rPr lang="en-GB" dirty="0"/>
+              <a:t> </a:t>
+            </a:r>
+          </a:p>
+          <a:p>
+            <a:r>
+              <a:rPr lang="en-GB" dirty="0"/>
+              <a:t>* Checkout </a:t>
+            </a:r>
+            <a:r>
+              <a:rPr lang="en-GB" dirty="0">
+                <a:hlinkClick r:id="rId3"/>
+              </a:rPr>
+              <a:t>debate</a:t>
+            </a:r>
+            <a:r>
+              <a:rPr lang="en-GB" dirty="0"/>
+              <a:t> with proponents of each architecture at </a:t>
+            </a:r>
+            <a:r>
+              <a:rPr lang="en-GB" dirty="0" err="1"/>
+              <a:t>Datanova</a:t>
+            </a:r>
+            <a:r>
+              <a:rPr lang="en-GB" dirty="0"/>
+              <a:t> 2021 hosted by </a:t>
+            </a:r>
+            <a:r>
+              <a:rPr lang="en-IN" b="1" i="0" u="none" strike="noStrike" dirty="0">
+                <a:solidFill>
+                  <a:srgbClr val="00A7B5"/>
+                </a:solidFill>
+                <a:effectLst/>
+                <a:latin typeface="Montserrat"/>
+                <a:hlinkClick r:id="rId4"/>
+              </a:rPr>
+              <a:t>Cindi Howson</a:t>
+            </a:r>
+            <a:endParaRPr lang="en-IN" b="1" i="0" u="none" strike="noStrike" dirty="0">
+              <a:solidFill>
+                <a:srgbClr val="00A7B5"/>
+              </a:solidFill>
+              <a:effectLst/>
+              <a:latin typeface="Montserrat"/>
+            </a:endParaRPr>
+          </a:p>
+          <a:p>
+            <a:endParaRPr lang="en-IN" b="1" i="0" u="none" strike="noStrike" dirty="0">
+              <a:solidFill>
+                <a:srgbClr val="00A7B5"/>
+              </a:solidFill>
+              <a:effectLst/>
+              <a:latin typeface="Montserrat"/>
+            </a:endParaRPr>
+          </a:p>
+          <a:p>
+            <a:endParaRPr lang="en-IN" dirty="0"/>
+          </a:p>
+        </p:txBody>
+      </p:sp>
+    </p:spTree>
+    <p:extLst>
+      <p:ext uri="{BB962C8B-B14F-4D97-AF65-F5344CB8AC3E}">
+        <p14:creationId xmlns:p14="http://schemas.microsoft.com/office/powerpoint/2010/main" val="1854144517"/>
+      </p:ext>
+    </p:extLst>
+  </p:cSld>
+  <p:clrMapOvr>
+    <a:masterClrMapping/>
+  </p:clrMapOvr>
+</p:sld>
+</file>
+
 <file path=ppt/slides/slide3.xml><?xml version="1.0" encoding="utf-8"?>
 <p:sld xmlns:a="http://schemas.openxmlformats.org/drawingml/2006/main" xmlns:r="http://schemas.openxmlformats.org/officeDocument/2006/relationships" xmlns:p="http://schemas.openxmlformats.org/presentationml/2006/main">
   <p:cSld>
@@ -24237,7 +24404,14 @@
           <a:p>
             <a:r>
               <a:rPr lang="en-GB" dirty="0"/>
-              <a:t>End goal - a data architecture to make smart decisions</a:t>
+              <a:t>End goal of a data architecture – </a:t>
+            </a:r>
+            <a:br>
+              <a:rPr lang="en-GB" dirty="0"/>
+            </a:br>
+            <a:r>
+              <a:rPr lang="en-GB" dirty="0"/>
+              <a:t>Allow USER to take SMART decisions </a:t>
             </a:r>
             <a:endParaRPr lang="en-IN" dirty="0"/>
           </a:p>
@@ -24266,7 +24440,7 @@
           <a:p>
             <a:r>
               <a:rPr lang="en-GB" dirty="0"/>
-              <a:t>* Know your goal.</a:t>
+              <a:t>* Define your goal well.</a:t>
             </a:r>
           </a:p>
           <a:p>
@@ -24275,8 +24449,52 @@
               <a:t>* Don’t choose a data tech stack, just because you / your team knew it well.</a:t>
             </a:r>
           </a:p>
+          <a:p>
+            <a:r>
+              <a:rPr lang="en-GB" dirty="0"/>
+              <a:t>* Try reduce copies. It is a key obstacle to data democratization &amp; fast time to value.</a:t>
+            </a:r>
+          </a:p>
+          <a:p>
+            <a:endParaRPr lang="en-GB" dirty="0"/>
+          </a:p>
         </p:txBody>
       </p:sp>
+      <p:pic>
+        <p:nvPicPr>
+          <p:cNvPr id="5" name="Picture 4">
+            <a:extLst>
+              <a:ext uri="{FF2B5EF4-FFF2-40B4-BE49-F238E27FC236}">
+                <a16:creationId xmlns:a16="http://schemas.microsoft.com/office/drawing/2014/main" id="{1236E338-05AE-4A9B-8542-634904EB740C}"/>
+              </a:ext>
+            </a:extLst>
+          </p:cNvPr>
+          <p:cNvPicPr>
+            <a:picLocks noChangeAspect="1"/>
+          </p:cNvPicPr>
+          <p:nvPr/>
+        </p:nvPicPr>
+        <p:blipFill>
+          <a:blip r:embed="rId3"/>
+          <a:stretch>
+            <a:fillRect/>
+          </a:stretch>
+        </p:blipFill>
+        <p:spPr>
+          <a:xfrm>
+            <a:off x="2586201" y="3809129"/>
+            <a:ext cx="7019597" cy="2800677"/>
+          </a:xfrm>
+          <a:prstGeom prst="rect">
+            <a:avLst/>
+          </a:prstGeom>
+          <a:ln>
+            <a:solidFill>
+              <a:schemeClr val="accent1"/>
+            </a:solidFill>
+          </a:ln>
+        </p:spPr>
+      </p:pic>
     </p:spTree>
     <p:extLst>
       <p:ext uri="{BB962C8B-B14F-4D97-AF65-F5344CB8AC3E}">
@@ -24291,6 +24509,108 @@
 </file>
 
 <file path=ppt/slides/slide5.xml><?xml version="1.0" encoding="utf-8"?>
+<p:sld xmlns:a="http://schemas.openxmlformats.org/drawingml/2006/main" xmlns:r="http://schemas.openxmlformats.org/officeDocument/2006/relationships" xmlns:p="http://schemas.openxmlformats.org/presentationml/2006/main">
+  <p:cSld>
+    <p:spTree>
+      <p:nvGrpSpPr>
+        <p:cNvPr id="1" name=""/>
+        <p:cNvGrpSpPr/>
+        <p:nvPr/>
+      </p:nvGrpSpPr>
+      <p:grpSpPr>
+        <a:xfrm>
+          <a:off x="0" y="0"/>
+          <a:ext cx="0" cy="0"/>
+          <a:chOff x="0" y="0"/>
+          <a:chExt cx="0" cy="0"/>
+        </a:xfrm>
+      </p:grpSpPr>
+      <p:sp>
+        <p:nvSpPr>
+          <p:cNvPr id="2" name="Title 1">
+            <a:extLst>
+              <a:ext uri="{FF2B5EF4-FFF2-40B4-BE49-F238E27FC236}">
+                <a16:creationId xmlns:a16="http://schemas.microsoft.com/office/drawing/2014/main" id="{DE1B8586-A777-41E7-BD55-E05278892E6B}"/>
+              </a:ext>
+            </a:extLst>
+          </p:cNvPr>
+          <p:cNvSpPr>
+            <a:spLocks noGrp="1"/>
+          </p:cNvSpPr>
+          <p:nvPr>
+            <p:ph type="title"/>
+          </p:nvPr>
+        </p:nvSpPr>
+        <p:spPr/>
+        <p:txBody>
+          <a:bodyPr/>
+          <a:lstStyle/>
+          <a:p>
+            <a:r>
+              <a:rPr lang="en-GB" dirty="0"/>
+              <a:t>Data persistence</a:t>
+            </a:r>
+            <a:endParaRPr lang="en-IN" dirty="0"/>
+          </a:p>
+        </p:txBody>
+      </p:sp>
+      <p:pic>
+        <p:nvPicPr>
+          <p:cNvPr id="4" name="Content Placeholder 3">
+            <a:extLst>
+              <a:ext uri="{FF2B5EF4-FFF2-40B4-BE49-F238E27FC236}">
+                <a16:creationId xmlns:a16="http://schemas.microsoft.com/office/drawing/2014/main" id="{993F6781-5232-44C1-B288-841A64EF385C}"/>
+              </a:ext>
+            </a:extLst>
+          </p:cNvPr>
+          <p:cNvPicPr>
+            <a:picLocks noGrp="1"/>
+          </p:cNvPicPr>
+          <p:nvPr>
+            <p:ph idx="1"/>
+          </p:nvPr>
+        </p:nvPicPr>
+        <p:blipFill>
+          <a:blip r:link="rId2">
+            <a:extLst>
+              <a:ext uri="{28A0092B-C50C-407E-A947-70E740481C1C}">
+                <a14:useLocalDpi xmlns:a14="http://schemas.microsoft.com/office/drawing/2010/main" val="0"/>
+              </a:ext>
+            </a:extLst>
+          </a:blip>
+          <a:srcRect/>
+          <a:stretch>
+            <a:fillRect/>
+          </a:stretch>
+        </p:blipFill>
+        <p:spPr bwMode="auto">
+          <a:xfrm>
+            <a:off x="1932215" y="1985555"/>
+            <a:ext cx="8327570" cy="4153988"/>
+          </a:xfrm>
+          <a:prstGeom prst="rect">
+            <a:avLst/>
+          </a:prstGeom>
+          <a:noFill/>
+          <a:ln>
+            <a:noFill/>
+          </a:ln>
+        </p:spPr>
+      </p:pic>
+    </p:spTree>
+    <p:extLst>
+      <p:ext uri="{BB962C8B-B14F-4D97-AF65-F5344CB8AC3E}">
+        <p14:creationId xmlns:p14="http://schemas.microsoft.com/office/powerpoint/2010/main" val="100059540"/>
+      </p:ext>
+    </p:extLst>
+  </p:cSld>
+  <p:clrMapOvr>
+    <a:masterClrMapping/>
+  </p:clrMapOvr>
+</p:sld>
+</file>
+
+<file path=ppt/slides/slide6.xml><?xml version="1.0" encoding="utf-8"?>
 <p:sld xmlns:a="http://schemas.openxmlformats.org/drawingml/2006/main" xmlns:r="http://schemas.openxmlformats.org/officeDocument/2006/relationships" xmlns:p="http://schemas.openxmlformats.org/presentationml/2006/main">
   <p:cSld>
     <p:spTree>
@@ -24393,7 +24713,7 @@
 </p:sld>
 </file>
 
-<file path=ppt/slides/slide6.xml><?xml version="1.0" encoding="utf-8"?>
+<file path=ppt/slides/slide7.xml><?xml version="1.0" encoding="utf-8"?>
 <p:sld xmlns:a="http://schemas.openxmlformats.org/drawingml/2006/main" xmlns:r="http://schemas.openxmlformats.org/officeDocument/2006/relationships" xmlns:p="http://schemas.openxmlformats.org/presentationml/2006/main">
   <p:cSld>
     <p:spTree>
@@ -24460,7 +24780,11 @@
           <a:bodyPr/>
           <a:lstStyle/>
           <a:p>
-            <a:endParaRPr lang="en-IN"/>
+            <a:r>
+              <a:rPr lang="en-GB" dirty="0"/>
+              <a:t>* Co-location of Compute &amp; Storage.</a:t>
+            </a:r>
+            <a:endParaRPr lang="en-IN" dirty="0"/>
           </a:p>
         </p:txBody>
       </p:sp>
@@ -24477,7 +24801,7 @@
 </p:sld>
 </file>
 
-<file path=ppt/slides/slide7.xml><?xml version="1.0" encoding="utf-8"?>
+<file path=ppt/slides/slide8.xml><?xml version="1.0" encoding="utf-8"?>
 <p:sld xmlns:a="http://schemas.openxmlformats.org/drawingml/2006/main" xmlns:r="http://schemas.openxmlformats.org/officeDocument/2006/relationships" xmlns:p="http://schemas.openxmlformats.org/presentationml/2006/main">
   <p:cSld>
     <p:spTree>
@@ -24544,7 +24868,11 @@
           <a:bodyPr/>
           <a:lstStyle/>
           <a:p>
-            <a:endParaRPr lang="en-IN"/>
+            <a:r>
+              <a:rPr lang="en-GB" dirty="0"/>
+              <a:t>* Separation of Compute &amp; Storage</a:t>
+            </a:r>
+            <a:endParaRPr lang="en-IN" dirty="0"/>
           </a:p>
         </p:txBody>
       </p:sp>
@@ -24561,7 +24889,7 @@
 </p:sld>
 </file>
 
-<file path=ppt/slides/slide8.xml><?xml version="1.0" encoding="utf-8"?>
+<file path=ppt/slides/slide9.xml><?xml version="1.0" encoding="utf-8"?>
 <p:sld xmlns:a="http://schemas.openxmlformats.org/drawingml/2006/main" xmlns:r="http://schemas.openxmlformats.org/officeDocument/2006/relationships" xmlns:p="http://schemas.openxmlformats.org/presentationml/2006/main">
   <p:cSld>
     <p:spTree>
@@ -24628,93 +24956,9 @@
           <a:bodyPr/>
           <a:lstStyle/>
           <a:p>
-            <a:endParaRPr lang="en-IN"/>
-          </a:p>
-        </p:txBody>
-      </p:sp>
-    </p:spTree>
-    <p:extLst>
-      <p:ext uri="{BB962C8B-B14F-4D97-AF65-F5344CB8AC3E}">
-        <p14:creationId xmlns:p14="http://schemas.microsoft.com/office/powerpoint/2010/main" val="3586273789"/>
-      </p:ext>
-    </p:extLst>
-  </p:cSld>
-  <p:clrMapOvr>
-    <a:masterClrMapping/>
-  </p:clrMapOvr>
-</p:sld>
-</file>
-
-<file path=ppt/slides/slide9.xml><?xml version="1.0" encoding="utf-8"?>
-<p:sld xmlns:a="http://schemas.openxmlformats.org/drawingml/2006/main" xmlns:r="http://schemas.openxmlformats.org/officeDocument/2006/relationships" xmlns:p="http://schemas.openxmlformats.org/presentationml/2006/main">
-  <p:cSld>
-    <p:spTree>
-      <p:nvGrpSpPr>
-        <p:cNvPr id="1" name=""/>
-        <p:cNvGrpSpPr/>
-        <p:nvPr/>
-      </p:nvGrpSpPr>
-      <p:grpSpPr>
-        <a:xfrm>
-          <a:off x="0" y="0"/>
-          <a:ext cx="0" cy="0"/>
-          <a:chOff x="0" y="0"/>
-          <a:chExt cx="0" cy="0"/>
-        </a:xfrm>
-      </p:grpSpPr>
-      <p:sp>
-        <p:nvSpPr>
-          <p:cNvPr id="2" name="Title 1">
-            <a:extLst>
-              <a:ext uri="{FF2B5EF4-FFF2-40B4-BE49-F238E27FC236}">
-                <a16:creationId xmlns:a16="http://schemas.microsoft.com/office/drawing/2014/main" id="{5B87CF65-8203-45A0-8A1D-449B3DDD5664}"/>
-              </a:ext>
-            </a:extLst>
-          </p:cNvPr>
-          <p:cNvSpPr>
-            <a:spLocks noGrp="1"/>
-          </p:cNvSpPr>
-          <p:nvPr>
-            <p:ph type="title"/>
-          </p:nvPr>
-        </p:nvSpPr>
-        <p:spPr/>
-        <p:txBody>
-          <a:bodyPr/>
-          <a:lstStyle/>
-          <a:p>
             <a:r>
               <a:rPr lang="en-GB" dirty="0"/>
-              <a:t>Data LAKEHOUSE</a:t>
-            </a:r>
-            <a:endParaRPr lang="en-IN" dirty="0"/>
-          </a:p>
-        </p:txBody>
-      </p:sp>
-      <p:sp>
-        <p:nvSpPr>
-          <p:cNvPr id="3" name="Content Placeholder 2">
-            <a:extLst>
-              <a:ext uri="{FF2B5EF4-FFF2-40B4-BE49-F238E27FC236}">
-                <a16:creationId xmlns:a16="http://schemas.microsoft.com/office/drawing/2014/main" id="{86CBC334-2225-4ED6-8E26-6DDD7BD9E2FA}"/>
-              </a:ext>
-            </a:extLst>
-          </p:cNvPr>
-          <p:cNvSpPr>
-            <a:spLocks noGrp="1"/>
-          </p:cNvSpPr>
-          <p:nvPr>
-            <p:ph idx="1"/>
-          </p:nvPr>
-        </p:nvSpPr>
-        <p:spPr/>
-        <p:txBody>
-          <a:bodyPr/>
-          <a:lstStyle/>
-          <a:p>
-            <a:r>
-              <a:rPr lang="en-GB" dirty="0"/>
-              <a:t>* Sting together the best of both worlds – Data warehouse and Data lake.</a:t>
+              <a:t>* Separation of Compute &amp; Data</a:t>
             </a:r>
             <a:endParaRPr lang="en-IN" dirty="0"/>
           </a:p>
@@ -24723,7 +24967,7 @@
     </p:spTree>
     <p:extLst>
       <p:ext uri="{BB962C8B-B14F-4D97-AF65-F5344CB8AC3E}">
-        <p14:creationId xmlns:p14="http://schemas.microsoft.com/office/powerpoint/2010/main" val="3135131184"/>
+        <p14:creationId xmlns:p14="http://schemas.microsoft.com/office/powerpoint/2010/main" val="3586273789"/>
       </p:ext>
     </p:extLst>
   </p:cSld>

</xml_diff>